<commit_message>
Updated Parent Behavior diagrams
</commit_message>
<xml_diff>
--- a/UAVbehavior/TRM/Diagrams/Parent Behaviors.pptx
+++ b/UAVbehavior/TRM/Diagrams/Parent Behaviors.pptx
@@ -291,7 +291,8 @@
           <a:p>
             <a:fld id="{1A5150B1-48F8-4B09-947B-DE0A23106E71}" type="datetimeFigureOut">
               <a:rPr lang="en-US" smtClean="0"/>
-              <a:t>11/24/2013</a:t>
+              <a:pPr/>
+              <a:t>12/9/2013</a:t>
             </a:fld>
             <a:endParaRPr lang="en-US"/>
           </a:p>
@@ -333,6 +334,7 @@
           <a:p>
             <a:fld id="{078C9893-8E58-494A-96ED-B24F6EE25C19}" type="slidenum">
               <a:rPr lang="en-US" smtClean="0"/>
+              <a:pPr/>
               <a:t>‹#›</a:t>
             </a:fld>
             <a:endParaRPr lang="en-US"/>
@@ -456,7 +458,8 @@
           <a:p>
             <a:fld id="{1A5150B1-48F8-4B09-947B-DE0A23106E71}" type="datetimeFigureOut">
               <a:rPr lang="en-US" smtClean="0"/>
-              <a:t>11/24/2013</a:t>
+              <a:pPr/>
+              <a:t>12/9/2013</a:t>
             </a:fld>
             <a:endParaRPr lang="en-US"/>
           </a:p>
@@ -498,6 +501,7 @@
           <a:p>
             <a:fld id="{078C9893-8E58-494A-96ED-B24F6EE25C19}" type="slidenum">
               <a:rPr lang="en-US" smtClean="0"/>
+              <a:pPr/>
               <a:t>‹#›</a:t>
             </a:fld>
             <a:endParaRPr lang="en-US"/>
@@ -631,7 +635,8 @@
           <a:p>
             <a:fld id="{1A5150B1-48F8-4B09-947B-DE0A23106E71}" type="datetimeFigureOut">
               <a:rPr lang="en-US" smtClean="0"/>
-              <a:t>11/24/2013</a:t>
+              <a:pPr/>
+              <a:t>12/9/2013</a:t>
             </a:fld>
             <a:endParaRPr lang="en-US"/>
           </a:p>
@@ -673,6 +678,7 @@
           <a:p>
             <a:fld id="{078C9893-8E58-494A-96ED-B24F6EE25C19}" type="slidenum">
               <a:rPr lang="en-US" smtClean="0"/>
+              <a:pPr/>
               <a:t>‹#›</a:t>
             </a:fld>
             <a:endParaRPr lang="en-US"/>
@@ -796,7 +802,8 @@
           <a:p>
             <a:fld id="{1A5150B1-48F8-4B09-947B-DE0A23106E71}" type="datetimeFigureOut">
               <a:rPr lang="en-US" smtClean="0"/>
-              <a:t>11/24/2013</a:t>
+              <a:pPr/>
+              <a:t>12/9/2013</a:t>
             </a:fld>
             <a:endParaRPr lang="en-US"/>
           </a:p>
@@ -838,6 +845,7 @@
           <a:p>
             <a:fld id="{078C9893-8E58-494A-96ED-B24F6EE25C19}" type="slidenum">
               <a:rPr lang="en-US" smtClean="0"/>
+              <a:pPr/>
               <a:t>‹#›</a:t>
             </a:fld>
             <a:endParaRPr lang="en-US"/>
@@ -1037,7 +1045,8 @@
           <a:p>
             <a:fld id="{1A5150B1-48F8-4B09-947B-DE0A23106E71}" type="datetimeFigureOut">
               <a:rPr lang="en-US" smtClean="0"/>
-              <a:t>11/24/2013</a:t>
+              <a:pPr/>
+              <a:t>12/9/2013</a:t>
             </a:fld>
             <a:endParaRPr lang="en-US"/>
           </a:p>
@@ -1079,6 +1088,7 @@
           <a:p>
             <a:fld id="{078C9893-8E58-494A-96ED-B24F6EE25C19}" type="slidenum">
               <a:rPr lang="en-US" smtClean="0"/>
+              <a:pPr/>
               <a:t>‹#›</a:t>
             </a:fld>
             <a:endParaRPr lang="en-US"/>
@@ -1320,7 +1330,8 @@
           <a:p>
             <a:fld id="{1A5150B1-48F8-4B09-947B-DE0A23106E71}" type="datetimeFigureOut">
               <a:rPr lang="en-US" smtClean="0"/>
-              <a:t>11/24/2013</a:t>
+              <a:pPr/>
+              <a:t>12/9/2013</a:t>
             </a:fld>
             <a:endParaRPr lang="en-US"/>
           </a:p>
@@ -1362,6 +1373,7 @@
           <a:p>
             <a:fld id="{078C9893-8E58-494A-96ED-B24F6EE25C19}" type="slidenum">
               <a:rPr lang="en-US" smtClean="0"/>
+              <a:pPr/>
               <a:t>‹#›</a:t>
             </a:fld>
             <a:endParaRPr lang="en-US"/>
@@ -1737,7 +1749,8 @@
           <a:p>
             <a:fld id="{1A5150B1-48F8-4B09-947B-DE0A23106E71}" type="datetimeFigureOut">
               <a:rPr lang="en-US" smtClean="0"/>
-              <a:t>11/24/2013</a:t>
+              <a:pPr/>
+              <a:t>12/9/2013</a:t>
             </a:fld>
             <a:endParaRPr lang="en-US"/>
           </a:p>
@@ -1779,6 +1792,7 @@
           <a:p>
             <a:fld id="{078C9893-8E58-494A-96ED-B24F6EE25C19}" type="slidenum">
               <a:rPr lang="en-US" smtClean="0"/>
+              <a:pPr/>
               <a:t>‹#›</a:t>
             </a:fld>
             <a:endParaRPr lang="en-US"/>
@@ -1850,7 +1864,8 @@
           <a:p>
             <a:fld id="{1A5150B1-48F8-4B09-947B-DE0A23106E71}" type="datetimeFigureOut">
               <a:rPr lang="en-US" smtClean="0"/>
-              <a:t>11/24/2013</a:t>
+              <a:pPr/>
+              <a:t>12/9/2013</a:t>
             </a:fld>
             <a:endParaRPr lang="en-US"/>
           </a:p>
@@ -1892,6 +1907,7 @@
           <a:p>
             <a:fld id="{078C9893-8E58-494A-96ED-B24F6EE25C19}" type="slidenum">
               <a:rPr lang="en-US" smtClean="0"/>
+              <a:pPr/>
               <a:t>‹#›</a:t>
             </a:fld>
             <a:endParaRPr lang="en-US"/>
@@ -1940,7 +1956,8 @@
           <a:p>
             <a:fld id="{1A5150B1-48F8-4B09-947B-DE0A23106E71}" type="datetimeFigureOut">
               <a:rPr lang="en-US" smtClean="0"/>
-              <a:t>11/24/2013</a:t>
+              <a:pPr/>
+              <a:t>12/9/2013</a:t>
             </a:fld>
             <a:endParaRPr lang="en-US"/>
           </a:p>
@@ -1982,6 +1999,7 @@
           <a:p>
             <a:fld id="{078C9893-8E58-494A-96ED-B24F6EE25C19}" type="slidenum">
               <a:rPr lang="en-US" smtClean="0"/>
+              <a:pPr/>
               <a:t>‹#›</a:t>
             </a:fld>
             <a:endParaRPr lang="en-US"/>
@@ -2212,7 +2230,8 @@
           <a:p>
             <a:fld id="{1A5150B1-48F8-4B09-947B-DE0A23106E71}" type="datetimeFigureOut">
               <a:rPr lang="en-US" smtClean="0"/>
-              <a:t>11/24/2013</a:t>
+              <a:pPr/>
+              <a:t>12/9/2013</a:t>
             </a:fld>
             <a:endParaRPr lang="en-US"/>
           </a:p>
@@ -2254,6 +2273,7 @@
           <a:p>
             <a:fld id="{078C9893-8E58-494A-96ED-B24F6EE25C19}" type="slidenum">
               <a:rPr lang="en-US" smtClean="0"/>
+              <a:pPr/>
               <a:t>‹#›</a:t>
             </a:fld>
             <a:endParaRPr lang="en-US"/>
@@ -2460,7 +2480,8 @@
           <a:p>
             <a:fld id="{1A5150B1-48F8-4B09-947B-DE0A23106E71}" type="datetimeFigureOut">
               <a:rPr lang="en-US" smtClean="0"/>
-              <a:t>11/24/2013</a:t>
+              <a:pPr/>
+              <a:t>12/9/2013</a:t>
             </a:fld>
             <a:endParaRPr lang="en-US"/>
           </a:p>
@@ -2502,6 +2523,7 @@
           <a:p>
             <a:fld id="{078C9893-8E58-494A-96ED-B24F6EE25C19}" type="slidenum">
               <a:rPr lang="en-US" smtClean="0"/>
+              <a:pPr/>
               <a:t>‹#›</a:t>
             </a:fld>
             <a:endParaRPr lang="en-US"/>
@@ -2668,7 +2690,8 @@
           <a:p>
             <a:fld id="{1A5150B1-48F8-4B09-947B-DE0A23106E71}" type="datetimeFigureOut">
               <a:rPr lang="en-US" smtClean="0"/>
-              <a:t>11/24/2013</a:t>
+              <a:pPr/>
+              <a:t>12/9/2013</a:t>
             </a:fld>
             <a:endParaRPr lang="en-US"/>
           </a:p>
@@ -2746,6 +2769,7 @@
           <a:p>
             <a:fld id="{078C9893-8E58-494A-96ED-B24F6EE25C19}" type="slidenum">
               <a:rPr lang="en-US" smtClean="0"/>
+              <a:pPr/>
               <a:t>‹#›</a:t>
             </a:fld>
             <a:endParaRPr lang="en-US"/>
@@ -3373,7 +3397,7 @@
             </a:r>
             <a:r>
               <a:rPr lang="en-US" sz="1200" i="1" dirty="0" err="1" smtClean="0"/>
-              <a:t>LocPerceptHokuyo</a:t>
+              <a:t>LocalizationPercept</a:t>
             </a:r>
             <a:r>
               <a:rPr lang="en-US" sz="1200" i="1" dirty="0" smtClean="0"/>
@@ -4278,7 +4302,7 @@
             </a:r>
             <a:r>
               <a:rPr lang="en-US" sz="1200" i="1" dirty="0" err="1" smtClean="0"/>
-              <a:t>LocPerceptHokuyo</a:t>
+              <a:t>LocalizationPercept</a:t>
             </a:r>
             <a:r>
               <a:rPr lang="en-US" sz="1200" i="1" dirty="0" smtClean="0"/>
@@ -5063,7 +5087,7 @@
               </a:r>
               <a:r>
                 <a:rPr lang="en-US" sz="1200" i="1" dirty="0" err="1" smtClean="0"/>
-                <a:t>LocPerceptHokuyo</a:t>
+                <a:t>LocalizaitonPercept</a:t>
               </a:r>
               <a:r>
                 <a:rPr lang="en-US" sz="1200" i="1" dirty="0" smtClean="0"/>
@@ -5477,7 +5501,7 @@
         <p:spPr>
           <a:xfrm>
             <a:off x="2286000" y="1143000"/>
-            <a:ext cx="2895600" cy="2438400"/>
+            <a:ext cx="2895600" cy="3581400"/>
           </a:xfrm>
           <a:prstGeom prst="rect">
             <a:avLst/>
@@ -5595,7 +5619,7 @@
         </p:nvSpPr>
         <p:spPr>
           <a:xfrm>
-            <a:off x="2895600" y="2667000"/>
+            <a:off x="2895600" y="2514600"/>
             <a:ext cx="1600200" cy="609600"/>
           </a:xfrm>
           <a:prstGeom prst="rect">
@@ -5671,8 +5695,8 @@
         </p:nvSpPr>
         <p:spPr>
           <a:xfrm>
-            <a:off x="3048000" y="2743200"/>
-            <a:ext cx="1600200" cy="461665"/>
+            <a:off x="3200400" y="2667000"/>
+            <a:ext cx="1600200" cy="338554"/>
           </a:xfrm>
           <a:prstGeom prst="rect">
             <a:avLst/>
@@ -5686,16 +5710,10 @@
           <a:lstStyle/>
           <a:p>
             <a:r>
-              <a:rPr lang="en-US" sz="1200" dirty="0" smtClean="0"/>
-              <a:t>Perpendicular</a:t>
-            </a:r>
-          </a:p>
-          <a:p>
-            <a:r>
-              <a:rPr lang="en-US" sz="1200" dirty="0" err="1" smtClean="0"/>
-              <a:t>ExponentialIncrease</a:t>
-            </a:r>
-            <a:endParaRPr lang="en-US" dirty="0"/>
+              <a:rPr lang="en-US" sz="1600" dirty="0" err="1" smtClean="0"/>
+              <a:t>AvoidUAV</a:t>
+            </a:r>
+            <a:endParaRPr lang="en-US" sz="1200" dirty="0" smtClean="0"/>
           </a:p>
         </p:txBody>
       </p:sp>
@@ -5733,7 +5751,7 @@
             </a:r>
             <a:r>
               <a:rPr lang="en-US" sz="1200" i="1" dirty="0" err="1" smtClean="0"/>
-              <a:t>LocPerceptHokuyo</a:t>
+              <a:t>LocalizationPercept</a:t>
             </a:r>
             <a:r>
               <a:rPr lang="en-US" sz="1200" i="1" dirty="0" smtClean="0"/>
@@ -5851,13 +5869,15 @@
       <p:cxnSp>
         <p:nvCxnSpPr>
           <p:cNvPr id="24" name="Straight Arrow Connector 23"/>
-          <p:cNvCxnSpPr/>
+          <p:cNvCxnSpPr>
+            <a:endCxn id="25" idx="0"/>
+          </p:cNvCxnSpPr>
           <p:nvPr/>
         </p:nvCxnSpPr>
         <p:spPr>
           <a:xfrm>
             <a:off x="4495800" y="1752600"/>
-            <a:ext cx="381000" cy="533400"/>
+            <a:ext cx="457200" cy="914400"/>
           </a:xfrm>
           <a:prstGeom prst="straightConnector1">
             <a:avLst/>
@@ -5889,7 +5909,7 @@
         </p:nvSpPr>
         <p:spPr>
           <a:xfrm>
-            <a:off x="4724400" y="2286000"/>
+            <a:off x="4800600" y="2667000"/>
             <a:ext cx="304800" cy="304800"/>
           </a:xfrm>
           <a:prstGeom prst="ellipse">
@@ -5945,14 +5965,14 @@
         <p:nvCxnSpPr>
           <p:cNvPr id="27" name="Straight Arrow Connector 26"/>
           <p:cNvCxnSpPr>
-            <a:endCxn id="25" idx="4"/>
+            <a:stCxn id="8" idx="3"/>
           </p:cNvCxnSpPr>
           <p:nvPr/>
         </p:nvCxnSpPr>
         <p:spPr>
-          <a:xfrm flipV="1">
-            <a:off x="4495800" y="2590800"/>
-            <a:ext cx="381000" cy="381000"/>
+          <a:xfrm>
+            <a:off x="4495800" y="2819400"/>
+            <a:ext cx="304800" cy="0"/>
           </a:xfrm>
           <a:prstGeom prst="straightConnector1">
             <a:avLst/>
@@ -5986,7 +6006,7 @@
         </p:nvCxnSpPr>
         <p:spPr>
           <a:xfrm>
-            <a:off x="5029200" y="2438400"/>
+            <a:off x="5105400" y="2819400"/>
             <a:ext cx="762000" cy="0"/>
           </a:xfrm>
           <a:prstGeom prst="straightConnector1">
@@ -6019,7 +6039,7 @@
         </p:nvSpPr>
         <p:spPr>
           <a:xfrm>
-            <a:off x="5181600" y="2362200"/>
+            <a:off x="5257800" y="2743200"/>
             <a:ext cx="609600" cy="461665"/>
           </a:xfrm>
           <a:prstGeom prst="rect">
@@ -6053,7 +6073,7 @@
         </p:nvSpPr>
         <p:spPr>
           <a:xfrm>
-            <a:off x="3200400" y="2438400"/>
+            <a:off x="3200400" y="2286000"/>
             <a:ext cx="1219200" cy="276999"/>
           </a:xfrm>
           <a:prstGeom prst="rect">
@@ -6069,7 +6089,7 @@
           <a:p>
             <a:r>
               <a:rPr lang="en-US" sz="1200" dirty="0" smtClean="0"/>
-              <a:t>Motor Schema</a:t>
+              <a:t>Child Behavior</a:t>
             </a:r>
             <a:endParaRPr lang="en-US" sz="1200" dirty="0"/>
           </a:p>
@@ -6117,6 +6137,233 @@
         <p:spPr>
           <a:xfrm>
             <a:off x="1371600" y="3048000"/>
+            <a:ext cx="1524000" cy="0"/>
+          </a:xfrm>
+          <a:prstGeom prst="straightConnector1">
+            <a:avLst/>
+          </a:prstGeom>
+          <a:ln>
+            <a:solidFill>
+              <a:schemeClr val="accent2"/>
+            </a:solidFill>
+            <a:tailEnd type="arrow"/>
+          </a:ln>
+        </p:spPr>
+        <p:style>
+          <a:lnRef idx="1">
+            <a:schemeClr val="accent1"/>
+          </a:lnRef>
+          <a:fillRef idx="0">
+            <a:schemeClr val="accent1"/>
+          </a:fillRef>
+          <a:effectRef idx="0">
+            <a:schemeClr val="accent1"/>
+          </a:effectRef>
+          <a:fontRef idx="minor">
+            <a:schemeClr val="tx1"/>
+          </a:fontRef>
+        </p:style>
+      </p:cxnSp>
+      <p:sp>
+        <p:nvSpPr>
+          <p:cNvPr id="20" name="Rectangle 19"/>
+          <p:cNvSpPr/>
+          <p:nvPr/>
+        </p:nvSpPr>
+        <p:spPr>
+          <a:xfrm>
+            <a:off x="2895600" y="3581400"/>
+            <a:ext cx="1600200" cy="609600"/>
+          </a:xfrm>
+          <a:prstGeom prst="rect">
+            <a:avLst/>
+          </a:prstGeom>
+          <a:solidFill>
+            <a:schemeClr val="accent1">
+              <a:lumMod val="20000"/>
+              <a:lumOff val="80000"/>
+            </a:schemeClr>
+          </a:solidFill>
+        </p:spPr>
+        <p:style>
+          <a:lnRef idx="2">
+            <a:schemeClr val="accent1">
+              <a:shade val="50000"/>
+            </a:schemeClr>
+          </a:lnRef>
+          <a:fillRef idx="1">
+            <a:schemeClr val="accent1"/>
+          </a:fillRef>
+          <a:effectRef idx="0">
+            <a:schemeClr val="accent1"/>
+          </a:effectRef>
+          <a:fontRef idx="minor">
+            <a:schemeClr val="lt1"/>
+          </a:fontRef>
+        </p:style>
+        <p:txBody>
+          <a:bodyPr rtlCol="0" anchor="ctr"/>
+          <a:lstStyle/>
+          <a:p>
+            <a:pPr algn="ctr"/>
+            <a:endParaRPr lang="en-US"/>
+          </a:p>
+        </p:txBody>
+      </p:sp>
+      <p:sp>
+        <p:nvSpPr>
+          <p:cNvPr id="21" name="TextBox 20"/>
+          <p:cNvSpPr txBox="1"/>
+          <p:nvPr/>
+        </p:nvSpPr>
+        <p:spPr>
+          <a:xfrm>
+            <a:off x="3048000" y="3657600"/>
+            <a:ext cx="1600200" cy="461665"/>
+          </a:xfrm>
+          <a:prstGeom prst="rect">
+            <a:avLst/>
+          </a:prstGeom>
+          <a:noFill/>
+        </p:spPr>
+        <p:txBody>
+          <a:bodyPr wrap="square" rtlCol="0">
+            <a:spAutoFit/>
+          </a:bodyPr>
+          <a:lstStyle/>
+          <a:p>
+            <a:r>
+              <a:rPr lang="en-US" sz="1200" dirty="0" smtClean="0"/>
+              <a:t>Perpendicular</a:t>
+            </a:r>
+          </a:p>
+          <a:p>
+            <a:r>
+              <a:rPr lang="en-US" sz="1200" dirty="0" err="1" smtClean="0"/>
+              <a:t>ExponentialIncrease</a:t>
+            </a:r>
+            <a:endParaRPr lang="en-US" dirty="0"/>
+          </a:p>
+        </p:txBody>
+      </p:sp>
+      <p:sp>
+        <p:nvSpPr>
+          <p:cNvPr id="26" name="TextBox 25"/>
+          <p:cNvSpPr txBox="1"/>
+          <p:nvPr/>
+        </p:nvSpPr>
+        <p:spPr>
+          <a:xfrm>
+            <a:off x="838200" y="3657600"/>
+            <a:ext cx="1524000" cy="461665"/>
+          </a:xfrm>
+          <a:prstGeom prst="rect">
+            <a:avLst/>
+          </a:prstGeom>
+          <a:noFill/>
+        </p:spPr>
+        <p:txBody>
+          <a:bodyPr wrap="square" rtlCol="0">
+            <a:spAutoFit/>
+          </a:bodyPr>
+          <a:lstStyle/>
+          <a:p>
+            <a:r>
+              <a:rPr lang="en-US" sz="1200" i="1" dirty="0" smtClean="0"/>
+              <a:t>Hallway</a:t>
+            </a:r>
+          </a:p>
+          <a:p>
+            <a:r>
+              <a:rPr lang="en-US" sz="1200" i="1" dirty="0" smtClean="0"/>
+              <a:t>(</a:t>
+            </a:r>
+            <a:r>
+              <a:rPr lang="en-US" sz="1200" i="1" dirty="0" err="1" smtClean="0"/>
+              <a:t>LocalizationPercept</a:t>
+            </a:r>
+            <a:r>
+              <a:rPr lang="en-US" sz="1200" i="1" dirty="0" smtClean="0"/>
+              <a:t>)</a:t>
+            </a:r>
+            <a:endParaRPr lang="en-US" sz="1200" i="1" dirty="0"/>
+          </a:p>
+        </p:txBody>
+      </p:sp>
+      <p:cxnSp>
+        <p:nvCxnSpPr>
+          <p:cNvPr id="30" name="Straight Arrow Connector 29"/>
+          <p:cNvCxnSpPr>
+            <a:endCxn id="25" idx="4"/>
+          </p:cNvCxnSpPr>
+          <p:nvPr/>
+        </p:nvCxnSpPr>
+        <p:spPr>
+          <a:xfrm flipV="1">
+            <a:off x="4495800" y="2971800"/>
+            <a:ext cx="457200" cy="1066800"/>
+          </a:xfrm>
+          <a:prstGeom prst="straightConnector1">
+            <a:avLst/>
+          </a:prstGeom>
+          <a:ln>
+            <a:tailEnd type="arrow"/>
+          </a:ln>
+        </p:spPr>
+        <p:style>
+          <a:lnRef idx="1">
+            <a:schemeClr val="accent1"/>
+          </a:lnRef>
+          <a:fillRef idx="0">
+            <a:schemeClr val="accent1"/>
+          </a:fillRef>
+          <a:effectRef idx="0">
+            <a:schemeClr val="accent1"/>
+          </a:effectRef>
+          <a:fontRef idx="minor">
+            <a:schemeClr val="tx1"/>
+          </a:fontRef>
+        </p:style>
+      </p:cxnSp>
+      <p:sp>
+        <p:nvSpPr>
+          <p:cNvPr id="32" name="TextBox 31"/>
+          <p:cNvSpPr txBox="1"/>
+          <p:nvPr/>
+        </p:nvSpPr>
+        <p:spPr>
+          <a:xfrm>
+            <a:off x="3200400" y="3352800"/>
+            <a:ext cx="1219200" cy="276999"/>
+          </a:xfrm>
+          <a:prstGeom prst="rect">
+            <a:avLst/>
+          </a:prstGeom>
+          <a:noFill/>
+        </p:spPr>
+        <p:txBody>
+          <a:bodyPr wrap="square" rtlCol="0">
+            <a:spAutoFit/>
+          </a:bodyPr>
+          <a:lstStyle/>
+          <a:p>
+            <a:r>
+              <a:rPr lang="en-US" sz="1200" dirty="0" smtClean="0"/>
+              <a:t>Motor Schema</a:t>
+            </a:r>
+            <a:endParaRPr lang="en-US" sz="1200" dirty="0"/>
+          </a:p>
+        </p:txBody>
+      </p:sp>
+      <p:cxnSp>
+        <p:nvCxnSpPr>
+          <p:cNvPr id="33" name="Straight Arrow Connector 32"/>
+          <p:cNvCxnSpPr/>
+          <p:nvPr/>
+        </p:nvCxnSpPr>
+        <p:spPr>
+          <a:xfrm>
+            <a:off x="1371600" y="4114800"/>
             <a:ext cx="1524000" cy="0"/>
           </a:xfrm>
           <a:prstGeom prst="straightConnector1">

</xml_diff>

<commit_message>
Fixed Avoid parent behavior
</commit_message>
<xml_diff>
--- a/UAVbehavior/TRM/Diagrams/Parent Behaviors.pptx
+++ b/UAVbehavior/TRM/Diagrams/Parent Behaviors.pptx
@@ -5494,7 +5494,7 @@
       </p:grpSpPr>
       <p:sp>
         <p:nvSpPr>
-          <p:cNvPr id="4" name="Rectangle 3"/>
+          <p:cNvPr id="34" name="Rectangle 33"/>
           <p:cNvSpPr/>
           <p:nvPr/>
         </p:nvSpPr>
@@ -5537,7 +5537,7 @@
       </p:sp>
       <p:sp>
         <p:nvSpPr>
-          <p:cNvPr id="5" name="TextBox 4"/>
+          <p:cNvPr id="36" name="TextBox 35"/>
           <p:cNvSpPr txBox="1"/>
           <p:nvPr/>
         </p:nvSpPr>
@@ -5567,7 +5567,7 @@
       </p:sp>
       <p:sp>
         <p:nvSpPr>
-          <p:cNvPr id="6" name="Rectangle 5"/>
+          <p:cNvPr id="37" name="Rectangle 36"/>
           <p:cNvSpPr/>
           <p:nvPr/>
         </p:nvSpPr>
@@ -5613,7 +5613,7 @@
       </p:sp>
       <p:sp>
         <p:nvSpPr>
-          <p:cNvPr id="8" name="Rectangle 7"/>
+          <p:cNvPr id="39" name="Rectangle 38"/>
           <p:cNvSpPr/>
           <p:nvPr/>
         </p:nvSpPr>
@@ -5659,7 +5659,7 @@
       </p:sp>
       <p:sp>
         <p:nvSpPr>
-          <p:cNvPr id="9" name="TextBox 8"/>
+          <p:cNvPr id="40" name="TextBox 39"/>
           <p:cNvSpPr txBox="1"/>
           <p:nvPr/>
         </p:nvSpPr>
@@ -5689,7 +5689,7 @@
       </p:sp>
       <p:sp>
         <p:nvSpPr>
-          <p:cNvPr id="11" name="TextBox 10"/>
+          <p:cNvPr id="41" name="TextBox 40"/>
           <p:cNvSpPr txBox="1"/>
           <p:nvPr/>
         </p:nvSpPr>
@@ -5719,14 +5719,14 @@
       </p:sp>
       <p:sp>
         <p:nvSpPr>
-          <p:cNvPr id="12" name="TextBox 11"/>
+          <p:cNvPr id="42" name="TextBox 41"/>
           <p:cNvSpPr txBox="1"/>
           <p:nvPr/>
         </p:nvSpPr>
         <p:spPr>
           <a:xfrm>
-            <a:off x="838200" y="2590800"/>
-            <a:ext cx="1524000" cy="461665"/>
+            <a:off x="838200" y="2667000"/>
+            <a:ext cx="1524000" cy="646331"/>
           </a:xfrm>
           <a:prstGeom prst="rect">
             <a:avLst/>
@@ -5741,8 +5741,9 @@
           <a:p>
             <a:r>
               <a:rPr lang="en-US" sz="1200" i="1" dirty="0" smtClean="0"/>
-              <a:t>Hallway</a:t>
-            </a:r>
+              <a:t>Neighbor UAV Locations</a:t>
+            </a:r>
+            <a:endParaRPr lang="en-US" sz="1200" i="1" dirty="0" smtClean="0"/>
           </a:p>
           <a:p>
             <a:r>
@@ -5751,7 +5752,7 @@
             </a:r>
             <a:r>
               <a:rPr lang="en-US" sz="1200" i="1" dirty="0" err="1" smtClean="0"/>
-              <a:t>LocalizationPercept</a:t>
+              <a:t>UAVPerceptSchema</a:t>
             </a:r>
             <a:r>
               <a:rPr lang="en-US" sz="1200" i="1" dirty="0" smtClean="0"/>
@@ -5763,7 +5764,7 @@
       </p:sp>
       <p:cxnSp>
         <p:nvCxnSpPr>
-          <p:cNvPr id="18" name="Straight Connector 17"/>
+          <p:cNvPr id="43" name="Straight Connector 42"/>
           <p:cNvCxnSpPr/>
           <p:nvPr/>
         </p:nvCxnSpPr>
@@ -5793,7 +5794,7 @@
       </p:cxnSp>
       <p:sp>
         <p:nvSpPr>
-          <p:cNvPr id="22" name="TextBox 21"/>
+          <p:cNvPr id="44" name="TextBox 43"/>
           <p:cNvSpPr txBox="1"/>
           <p:nvPr/>
         </p:nvSpPr>
@@ -5838,7 +5839,7 @@
       </p:sp>
       <p:sp>
         <p:nvSpPr>
-          <p:cNvPr id="23" name="TextBox 22"/>
+          <p:cNvPr id="45" name="TextBox 44"/>
           <p:cNvSpPr txBox="1"/>
           <p:nvPr/>
         </p:nvSpPr>
@@ -5868,9 +5869,9 @@
       </p:sp>
       <p:cxnSp>
         <p:nvCxnSpPr>
-          <p:cNvPr id="24" name="Straight Arrow Connector 23"/>
+          <p:cNvPr id="46" name="Straight Arrow Connector 45"/>
           <p:cNvCxnSpPr>
-            <a:endCxn id="25" idx="0"/>
+            <a:endCxn id="47" idx="0"/>
           </p:cNvCxnSpPr>
           <p:nvPr/>
         </p:nvCxnSpPr>
@@ -5903,7 +5904,7 @@
       </p:cxnSp>
       <p:sp>
         <p:nvSpPr>
-          <p:cNvPr id="25" name="Oval 24"/>
+          <p:cNvPr id="47" name="Oval 46"/>
           <p:cNvSpPr/>
           <p:nvPr/>
         </p:nvSpPr>
@@ -5963,9 +5964,9 @@
       </p:sp>
       <p:cxnSp>
         <p:nvCxnSpPr>
-          <p:cNvPr id="27" name="Straight Arrow Connector 26"/>
+          <p:cNvPr id="48" name="Straight Arrow Connector 47"/>
           <p:cNvCxnSpPr>
-            <a:stCxn id="8" idx="3"/>
+            <a:stCxn id="39" idx="3"/>
           </p:cNvCxnSpPr>
           <p:nvPr/>
         </p:nvCxnSpPr>
@@ -5998,9 +5999,9 @@
       </p:cxnSp>
       <p:cxnSp>
         <p:nvCxnSpPr>
-          <p:cNvPr id="28" name="Straight Arrow Connector 27"/>
+          <p:cNvPr id="49" name="Straight Arrow Connector 48"/>
           <p:cNvCxnSpPr>
-            <a:stCxn id="25" idx="6"/>
+            <a:stCxn id="47" idx="6"/>
           </p:cNvCxnSpPr>
           <p:nvPr/>
         </p:nvCxnSpPr>
@@ -6033,7 +6034,7 @@
       </p:cxnSp>
       <p:sp>
         <p:nvSpPr>
-          <p:cNvPr id="29" name="TextBox 28"/>
+          <p:cNvPr id="50" name="TextBox 49"/>
           <p:cNvSpPr txBox="1"/>
           <p:nvPr/>
         </p:nvSpPr>
@@ -6067,7 +6068,7 @@
       </p:sp>
       <p:sp>
         <p:nvSpPr>
-          <p:cNvPr id="31" name="TextBox 30"/>
+          <p:cNvPr id="51" name="TextBox 50"/>
           <p:cNvSpPr txBox="1"/>
           <p:nvPr/>
         </p:nvSpPr>
@@ -6097,7 +6098,7 @@
       </p:sp>
       <p:cxnSp>
         <p:nvCxnSpPr>
-          <p:cNvPr id="35" name="Straight Arrow Connector 34"/>
+          <p:cNvPr id="52" name="Straight Arrow Connector 51"/>
           <p:cNvCxnSpPr/>
           <p:nvPr/>
         </p:nvCxnSpPr>
@@ -6130,7 +6131,7 @@
       </p:cxnSp>
       <p:cxnSp>
         <p:nvCxnSpPr>
-          <p:cNvPr id="38" name="Straight Arrow Connector 37"/>
+          <p:cNvPr id="53" name="Straight Arrow Connector 52"/>
           <p:cNvCxnSpPr/>
           <p:nvPr/>
         </p:nvCxnSpPr>
@@ -6144,7 +6145,7 @@
           </a:prstGeom>
           <a:ln>
             <a:solidFill>
-              <a:schemeClr val="accent2"/>
+              <a:schemeClr val="accent3"/>
             </a:solidFill>
             <a:tailEnd type="arrow"/>
           </a:ln>
@@ -6166,7 +6167,7 @@
       </p:cxnSp>
       <p:sp>
         <p:nvSpPr>
-          <p:cNvPr id="20" name="Rectangle 19"/>
+          <p:cNvPr id="54" name="Rectangle 53"/>
           <p:cNvSpPr/>
           <p:nvPr/>
         </p:nvSpPr>
@@ -6212,7 +6213,7 @@
       </p:sp>
       <p:sp>
         <p:nvSpPr>
-          <p:cNvPr id="21" name="TextBox 20"/>
+          <p:cNvPr id="55" name="TextBox 54"/>
           <p:cNvSpPr txBox="1"/>
           <p:nvPr/>
         </p:nvSpPr>
@@ -6248,7 +6249,7 @@
       </p:sp>
       <p:sp>
         <p:nvSpPr>
-          <p:cNvPr id="26" name="TextBox 25"/>
+          <p:cNvPr id="56" name="TextBox 55"/>
           <p:cNvSpPr txBox="1"/>
           <p:nvPr/>
         </p:nvSpPr>
@@ -6292,9 +6293,9 @@
       </p:sp>
       <p:cxnSp>
         <p:nvCxnSpPr>
-          <p:cNvPr id="30" name="Straight Arrow Connector 29"/>
+          <p:cNvPr id="57" name="Straight Arrow Connector 56"/>
           <p:cNvCxnSpPr>
-            <a:endCxn id="25" idx="4"/>
+            <a:endCxn id="47" idx="4"/>
           </p:cNvCxnSpPr>
           <p:nvPr/>
         </p:nvCxnSpPr>
@@ -6327,7 +6328,7 @@
       </p:cxnSp>
       <p:sp>
         <p:nvSpPr>
-          <p:cNvPr id="32" name="TextBox 31"/>
+          <p:cNvPr id="58" name="TextBox 57"/>
           <p:cNvSpPr txBox="1"/>
           <p:nvPr/>
         </p:nvSpPr>
@@ -6357,7 +6358,7 @@
       </p:sp>
       <p:cxnSp>
         <p:nvCxnSpPr>
-          <p:cNvPr id="33" name="Straight Arrow Connector 32"/>
+          <p:cNvPr id="59" name="Straight Arrow Connector 58"/>
           <p:cNvCxnSpPr/>
           <p:nvPr/>
         </p:nvCxnSpPr>

</xml_diff>